<commit_message>
update lectures 1 & 2
</commit_message>
<xml_diff>
--- a/lectures/lecture2.pptx
+++ b/lectures/lecture2.pptx
@@ -319,7 +319,7 @@
           <a:p>
             <a:fld id="{88225CEC-B4DB-421E-BD7D-F5D0F79EA658}" type="datetimeFigureOut">
               <a:rPr lang="en-US" smtClean="0"/>
-              <a:t>2/2/2021</a:t>
+              <a:t>2/22/2021</a:t>
             </a:fld>
             <a:endParaRPr lang="en-US"/>
           </a:p>
@@ -849,7 +849,7 @@
           <a:p>
             <a:fld id="{2F895662-E2E6-47BC-B493-3EA4FCF734B6}" type="datetime1">
               <a:rPr lang="en-US" smtClean="0"/>
-              <a:t>2/2/2021</a:t>
+              <a:t>2/22/2021</a:t>
             </a:fld>
             <a:endParaRPr lang="en-US"/>
           </a:p>
@@ -1017,7 +1017,7 @@
           <a:p>
             <a:fld id="{0F4BFD65-5602-4172-B54C-6A65165A1845}" type="datetime1">
               <a:rPr lang="en-US" smtClean="0"/>
-              <a:t>2/2/2021</a:t>
+              <a:t>2/22/2021</a:t>
             </a:fld>
             <a:endParaRPr lang="en-US"/>
           </a:p>
@@ -1195,7 +1195,7 @@
           <a:p>
             <a:fld id="{6CA290DE-8138-4626-BC3F-DF68A3BD09D8}" type="datetime1">
               <a:rPr lang="en-US" smtClean="0"/>
-              <a:t>2/2/2021</a:t>
+              <a:t>2/22/2021</a:t>
             </a:fld>
             <a:endParaRPr lang="en-US"/>
           </a:p>
@@ -1363,7 +1363,7 @@
           <a:p>
             <a:fld id="{E1BE8E3F-75DF-45E8-9F6B-4F2E22494A32}" type="datetime1">
               <a:rPr lang="en-US" smtClean="0"/>
-              <a:t>2/2/2021</a:t>
+              <a:t>2/22/2021</a:t>
             </a:fld>
             <a:endParaRPr lang="en-US"/>
           </a:p>
@@ -1608,7 +1608,7 @@
           <a:p>
             <a:fld id="{82F4DA82-3E7C-4CFB-A30B-53D3893EF32E}" type="datetime1">
               <a:rPr lang="en-US" smtClean="0"/>
-              <a:t>2/2/2021</a:t>
+              <a:t>2/22/2021</a:t>
             </a:fld>
             <a:endParaRPr lang="en-US"/>
           </a:p>
@@ -1893,7 +1893,7 @@
           <a:p>
             <a:fld id="{36B3D8AD-4C83-4D73-AEE7-5E801ED5356C}" type="datetime1">
               <a:rPr lang="en-US" smtClean="0"/>
-              <a:t>2/2/2021</a:t>
+              <a:t>2/22/2021</a:t>
             </a:fld>
             <a:endParaRPr lang="en-US"/>
           </a:p>
@@ -2312,7 +2312,7 @@
           <a:p>
             <a:fld id="{7E6893DB-DD64-49D6-A5C2-F6ACE2B1530B}" type="datetime1">
               <a:rPr lang="en-US" smtClean="0"/>
-              <a:t>2/2/2021</a:t>
+              <a:t>2/22/2021</a:t>
             </a:fld>
             <a:endParaRPr lang="en-US"/>
           </a:p>
@@ -2429,7 +2429,7 @@
           <a:p>
             <a:fld id="{FC0A94C3-7A0F-4E28-9A06-985C13FFBB01}" type="datetime1">
               <a:rPr lang="en-US" smtClean="0"/>
-              <a:t>2/2/2021</a:t>
+              <a:t>2/22/2021</a:t>
             </a:fld>
             <a:endParaRPr lang="en-US"/>
           </a:p>
@@ -2524,7 +2524,7 @@
           <a:p>
             <a:fld id="{8587B2D3-0011-41C0-B2C5-6B713844DB1C}" type="datetime1">
               <a:rPr lang="en-US" smtClean="0"/>
-              <a:t>2/2/2021</a:t>
+              <a:t>2/22/2021</a:t>
             </a:fld>
             <a:endParaRPr lang="en-US"/>
           </a:p>
@@ -2799,7 +2799,7 @@
           <a:p>
             <a:fld id="{B53EE19A-9EFD-417C-93CE-FC2F485F3533}" type="datetime1">
               <a:rPr lang="en-US" smtClean="0"/>
-              <a:t>2/2/2021</a:t>
+              <a:t>2/22/2021</a:t>
             </a:fld>
             <a:endParaRPr lang="en-US"/>
           </a:p>
@@ -3054,7 +3054,7 @@
           <a:p>
             <a:fld id="{87D9954C-8CD1-4968-8DFE-C7948C62F830}" type="datetime1">
               <a:rPr lang="en-US" smtClean="0"/>
-              <a:t>2/2/2021</a:t>
+              <a:t>2/22/2021</a:t>
             </a:fld>
             <a:endParaRPr lang="en-US"/>
           </a:p>
@@ -3270,7 +3270,7 @@
           <a:p>
             <a:fld id="{B4BF092D-FE75-4F27-B0C3-A897761F708C}" type="datetime1">
               <a:rPr lang="en-US" smtClean="0"/>
-              <a:t>2/2/2021</a:t>
+              <a:t>2/22/2021</a:t>
             </a:fld>
             <a:endParaRPr lang="en-US"/>
           </a:p>
@@ -4304,7 +4304,7 @@
           <a:graphicData uri="http://schemas.openxmlformats.org/presentationml/2006/ole">
             <mc:AlternateContent xmlns:mc="http://schemas.openxmlformats.org/markup-compatibility/2006">
               <mc:Choice xmlns:v="urn:schemas-microsoft-com:vml" Requires="v">
-                <p:oleObj spid="_x0000_s3248" name="Equation" r:id="rId3" imgW="139680" imgH="203040" progId="Equation.DSMT4">
+                <p:oleObj spid="_x0000_s3260" name="Equation" r:id="rId3" imgW="139680" imgH="203040" progId="Equation.DSMT4">
                   <p:embed/>
                 </p:oleObj>
               </mc:Choice>
@@ -4361,7 +4361,7 @@
           <a:graphicData uri="http://schemas.openxmlformats.org/presentationml/2006/ole">
             <mc:AlternateContent xmlns:mc="http://schemas.openxmlformats.org/markup-compatibility/2006">
               <mc:Choice xmlns:v="urn:schemas-microsoft-com:vml" Requires="v">
-                <p:oleObj spid="_x0000_s3249" name="Equation" r:id="rId5" imgW="2450880" imgH="253800" progId="Equation.DSMT4">
+                <p:oleObj spid="_x0000_s3261" name="Equation" r:id="rId5" imgW="2450880" imgH="253800" progId="Equation.DSMT4">
                   <p:embed/>
                 </p:oleObj>
               </mc:Choice>
@@ -4418,7 +4418,7 @@
           <a:graphicData uri="http://schemas.openxmlformats.org/presentationml/2006/ole">
             <mc:AlternateContent xmlns:mc="http://schemas.openxmlformats.org/markup-compatibility/2006">
               <mc:Choice xmlns:v="urn:schemas-microsoft-com:vml" Requires="v">
-                <p:oleObj spid="_x0000_s3250" name="Equation" r:id="rId7" imgW="164880" imgH="228600" progId="Equation.DSMT4">
+                <p:oleObj spid="_x0000_s3262" name="Equation" r:id="rId7" imgW="164880" imgH="228600" progId="Equation.DSMT4">
                   <p:embed/>
                 </p:oleObj>
               </mc:Choice>
@@ -4555,7 +4555,7 @@
           <a:graphicData uri="http://schemas.openxmlformats.org/presentationml/2006/ole">
             <mc:AlternateContent xmlns:mc="http://schemas.openxmlformats.org/markup-compatibility/2006">
               <mc:Choice xmlns:v="urn:schemas-microsoft-com:vml" Requires="v">
-                <p:oleObj spid="_x0000_s3251" name="Equation" r:id="rId3" imgW="139680" imgH="203040" progId="Equation.DSMT4">
+                <p:oleObj spid="_x0000_s3263" name="Equation" r:id="rId3" imgW="139680" imgH="203040" progId="Equation.DSMT4">
                   <p:embed/>
                 </p:oleObj>
               </mc:Choice>
@@ -6809,7 +6809,7 @@
           <a:graphicData uri="http://schemas.openxmlformats.org/presentationml/2006/ole">
             <mc:AlternateContent xmlns:mc="http://schemas.openxmlformats.org/markup-compatibility/2006">
               <mc:Choice xmlns:v="urn:schemas-microsoft-com:vml" Requires="v">
-                <p:oleObj spid="_x0000_s4216" name="Equation" r:id="rId5" imgW="393480" imgH="203040" progId="Equation.DSMT4">
+                <p:oleObj spid="_x0000_s4222" name="Equation" r:id="rId5" imgW="393480" imgH="203040" progId="Equation.DSMT4">
                   <p:embed/>
                 </p:oleObj>
               </mc:Choice>
@@ -6866,7 +6866,7 @@
           <a:graphicData uri="http://schemas.openxmlformats.org/presentationml/2006/ole">
             <mc:AlternateContent xmlns:mc="http://schemas.openxmlformats.org/markup-compatibility/2006">
               <mc:Choice xmlns:v="urn:schemas-microsoft-com:vml" Requires="v">
-                <p:oleObj spid="_x0000_s4217" name="Equation" r:id="rId7" imgW="355320" imgH="203040" progId="Equation.DSMT4">
+                <p:oleObj spid="_x0000_s4223" name="Equation" r:id="rId7" imgW="355320" imgH="203040" progId="Equation.DSMT4">
                   <p:embed/>
                 </p:oleObj>
               </mc:Choice>
@@ -8491,7 +8491,7 @@
           <a:graphicData uri="http://schemas.openxmlformats.org/presentationml/2006/ole">
             <mc:AlternateContent xmlns:mc="http://schemas.openxmlformats.org/markup-compatibility/2006">
               <mc:Choice xmlns:v="urn:schemas-microsoft-com:vml" Requires="v">
-                <p:oleObj spid="_x0000_s5169" name="Equation" r:id="rId5" imgW="1104840" imgH="304560" progId="Equation.DSMT4">
+                <p:oleObj spid="_x0000_s5172" name="Equation" r:id="rId5" imgW="1104840" imgH="304560" progId="Equation.DSMT4">
                   <p:embed/>
                 </p:oleObj>
               </mc:Choice>
@@ -8993,7 +8993,7 @@
           <a:graphicData uri="http://schemas.openxmlformats.org/presentationml/2006/ole">
             <mc:AlternateContent xmlns:mc="http://schemas.openxmlformats.org/markup-compatibility/2006">
               <mc:Choice xmlns:v="urn:schemas-microsoft-com:vml" Requires="v">
-                <p:oleObj spid="_x0000_s11295" name="Equation" r:id="rId9" imgW="1231560" imgH="291960" progId="Equation.DSMT4">
+                <p:oleObj spid="_x0000_s11298" name="Equation" r:id="rId9" imgW="1231560" imgH="291960" progId="Equation.DSMT4">
                   <p:embed/>
                 </p:oleObj>
               </mc:Choice>
@@ -10211,7 +10211,7 @@
           <a:graphicData uri="http://schemas.openxmlformats.org/presentationml/2006/ole">
             <mc:AlternateContent xmlns:mc="http://schemas.openxmlformats.org/markup-compatibility/2006">
               <mc:Choice xmlns:v="urn:schemas-microsoft-com:vml" Requires="v">
-                <p:oleObj spid="_x0000_s7216" name="Equation" r:id="rId6" imgW="1676160" imgH="304560" progId="Equation.DSMT4">
+                <p:oleObj spid="_x0000_s7219" name="Equation" r:id="rId6" imgW="1676160" imgH="304560" progId="Equation.DSMT4">
                   <p:embed/>
                 </p:oleObj>
               </mc:Choice>
@@ -10790,7 +10790,7 @@
           <a:graphicData uri="http://schemas.openxmlformats.org/presentationml/2006/ole">
             <mc:AlternateContent xmlns:mc="http://schemas.openxmlformats.org/markup-compatibility/2006">
               <mc:Choice xmlns:v="urn:schemas-microsoft-com:vml" Requires="v">
-                <p:oleObj spid="_x0000_s6195" name="Equation" r:id="rId3" imgW="1104840" imgH="304560" progId="Equation.DSMT4">
+                <p:oleObj spid="_x0000_s6198" name="Equation" r:id="rId3" imgW="1104840" imgH="304560" progId="Equation.DSMT4">
                   <p:embed/>
                 </p:oleObj>
               </mc:Choice>
@@ -11470,7 +11470,7 @@
           <a:graphicData uri="http://schemas.openxmlformats.org/presentationml/2006/ole">
             <mc:AlternateContent xmlns:mc="http://schemas.openxmlformats.org/markup-compatibility/2006">
               <mc:Choice xmlns:v="urn:schemas-microsoft-com:vml" Requires="v">
-                <p:oleObj spid="_x0000_s12316" name="Equation" r:id="rId3" imgW="1676160" imgH="304560" progId="Equation.DSMT4">
+                <p:oleObj spid="_x0000_s12319" name="Equation" r:id="rId3" imgW="1676160" imgH="304560" progId="Equation.DSMT4">
                   <p:embed/>
                 </p:oleObj>
               </mc:Choice>
@@ -21147,7 +21147,7 @@
             <a:graphicData uri="http://schemas.openxmlformats.org/presentationml/2006/ole">
               <mc:AlternateContent xmlns:mc="http://schemas.openxmlformats.org/markup-compatibility/2006">
                 <mc:Choice xmlns:v="urn:schemas-microsoft-com:vml" Requires="v">
-                  <p:oleObj spid="_x0000_s14411" name="Equation" r:id="rId3" imgW="203040" imgH="253800" progId="Equation.DSMT4">
+                  <p:oleObj spid="_x0000_s14447" name="Equation" r:id="rId3" imgW="203040" imgH="253800" progId="Equation.DSMT4">
                     <p:embed/>
                   </p:oleObj>
                 </mc:Choice>
@@ -21521,7 +21521,7 @@
               <a:graphicData uri="http://schemas.openxmlformats.org/presentationml/2006/ole">
                 <mc:AlternateContent xmlns:mc="http://schemas.openxmlformats.org/markup-compatibility/2006">
                   <mc:Choice xmlns:v="urn:schemas-microsoft-com:vml" Requires="v">
-                    <p:oleObj spid="_x0000_s14412" name="Equation" r:id="rId5" imgW="190440" imgH="228600" progId="Equation.DSMT4">
+                    <p:oleObj spid="_x0000_s14448" name="Equation" r:id="rId5" imgW="190440" imgH="228600" progId="Equation.DSMT4">
                       <p:embed/>
                     </p:oleObj>
                   </mc:Choice>
@@ -21584,7 +21584,7 @@
               <a:graphicData uri="http://schemas.openxmlformats.org/presentationml/2006/ole">
                 <mc:AlternateContent xmlns:mc="http://schemas.openxmlformats.org/markup-compatibility/2006">
                   <mc:Choice xmlns:v="urn:schemas-microsoft-com:vml" Requires="v">
-                    <p:oleObj spid="_x0000_s14413" name="Equation" r:id="rId7" imgW="241200" imgH="253800" progId="Equation.DSMT4">
+                    <p:oleObj spid="_x0000_s14449" name="Equation" r:id="rId7" imgW="241200" imgH="253800" progId="Equation.DSMT4">
                       <p:embed/>
                     </p:oleObj>
                   </mc:Choice>
@@ -21667,7 +21667,7 @@
                 <a:graphicData uri="http://schemas.openxmlformats.org/presentationml/2006/ole">
                   <mc:AlternateContent xmlns:mc="http://schemas.openxmlformats.org/markup-compatibility/2006">
                     <mc:Choice xmlns:v="urn:schemas-microsoft-com:vml" Requires="v">
-                      <p:oleObj spid="_x0000_s14414" name="Equation" r:id="rId9" imgW="596880" imgH="241200" progId="Equation.DSMT4">
+                      <p:oleObj spid="_x0000_s14450" name="Equation" r:id="rId9" imgW="596880" imgH="241200" progId="Equation.DSMT4">
                         <p:embed/>
                       </p:oleObj>
                     </mc:Choice>
@@ -21793,7 +21793,7 @@
                 <a:graphicData uri="http://schemas.openxmlformats.org/presentationml/2006/ole">
                   <mc:AlternateContent xmlns:mc="http://schemas.openxmlformats.org/markup-compatibility/2006">
                     <mc:Choice xmlns:v="urn:schemas-microsoft-com:vml" Requires="v">
-                      <p:oleObj spid="_x0000_s14415" name="Equation" r:id="rId11" imgW="622080" imgH="241200" progId="Equation.DSMT4">
+                      <p:oleObj spid="_x0000_s14451" name="Equation" r:id="rId11" imgW="622080" imgH="241200" progId="Equation.DSMT4">
                         <p:embed/>
                       </p:oleObj>
                     </mc:Choice>
@@ -21919,7 +21919,7 @@
                 <a:graphicData uri="http://schemas.openxmlformats.org/presentationml/2006/ole">
                   <mc:AlternateContent xmlns:mc="http://schemas.openxmlformats.org/markup-compatibility/2006">
                     <mc:Choice xmlns:v="urn:schemas-microsoft-com:vml" Requires="v">
-                      <p:oleObj spid="_x0000_s14416" name="Equation" r:id="rId13" imgW="609480" imgH="241200" progId="Equation.DSMT4">
+                      <p:oleObj spid="_x0000_s14452" name="Equation" r:id="rId13" imgW="609480" imgH="241200" progId="Equation.DSMT4">
                         <p:embed/>
                       </p:oleObj>
                     </mc:Choice>
@@ -22047,7 +22047,7 @@
             <a:graphicData uri="http://schemas.openxmlformats.org/presentationml/2006/ole">
               <mc:AlternateContent xmlns:mc="http://schemas.openxmlformats.org/markup-compatibility/2006">
                 <mc:Choice xmlns:v="urn:schemas-microsoft-com:vml" Requires="v">
-                  <p:oleObj spid="_x0000_s14417" name="Equation" r:id="rId15" imgW="203040" imgH="253800" progId="Equation.DSMT4">
+                  <p:oleObj spid="_x0000_s14453" name="Equation" r:id="rId15" imgW="203040" imgH="253800" progId="Equation.DSMT4">
                     <p:embed/>
                   </p:oleObj>
                 </mc:Choice>
@@ -22407,7 +22407,7 @@
             <a:graphicData uri="http://schemas.openxmlformats.org/presentationml/2006/ole">
               <mc:AlternateContent xmlns:mc="http://schemas.openxmlformats.org/markup-compatibility/2006">
                 <mc:Choice xmlns:v="urn:schemas-microsoft-com:vml" Requires="v">
-                  <p:oleObj spid="_x0000_s14418" name="Equation" r:id="rId16" imgW="190440" imgH="228600" progId="Equation.DSMT4">
+                  <p:oleObj spid="_x0000_s14454" name="Equation" r:id="rId16" imgW="190440" imgH="228600" progId="Equation.DSMT4">
                     <p:embed/>
                   </p:oleObj>
                 </mc:Choice>
@@ -22476,7 +22476,7 @@
             <a:graphicData uri="http://schemas.openxmlformats.org/presentationml/2006/ole">
               <mc:AlternateContent xmlns:mc="http://schemas.openxmlformats.org/markup-compatibility/2006">
                 <mc:Choice xmlns:v="urn:schemas-microsoft-com:vml" Requires="v">
-                  <p:oleObj spid="_x0000_s14419" name="Equation" r:id="rId17" imgW="241200" imgH="253800" progId="Equation.DSMT4">
+                  <p:oleObj spid="_x0000_s14455" name="Equation" r:id="rId17" imgW="241200" imgH="253800" progId="Equation.DSMT4">
                     <p:embed/>
                   </p:oleObj>
                 </mc:Choice>
@@ -22565,7 +22565,7 @@
               <a:graphicData uri="http://schemas.openxmlformats.org/presentationml/2006/ole">
                 <mc:AlternateContent xmlns:mc="http://schemas.openxmlformats.org/markup-compatibility/2006">
                   <mc:Choice xmlns:v="urn:schemas-microsoft-com:vml" Requires="v">
-                    <p:oleObj spid="_x0000_s14420" name="Equation" r:id="rId18" imgW="596880" imgH="241200" progId="Equation.DSMT4">
+                    <p:oleObj spid="_x0000_s14456" name="Equation" r:id="rId18" imgW="596880" imgH="241200" progId="Equation.DSMT4">
                       <p:embed/>
                     </p:oleObj>
                   </mc:Choice>
@@ -22691,7 +22691,7 @@
               <a:graphicData uri="http://schemas.openxmlformats.org/presentationml/2006/ole">
                 <mc:AlternateContent xmlns:mc="http://schemas.openxmlformats.org/markup-compatibility/2006">
                   <mc:Choice xmlns:v="urn:schemas-microsoft-com:vml" Requires="v">
-                    <p:oleObj spid="_x0000_s14421" name="Equation" r:id="rId19" imgW="622080" imgH="241200" progId="Equation.DSMT4">
+                    <p:oleObj spid="_x0000_s14457" name="Equation" r:id="rId19" imgW="622080" imgH="241200" progId="Equation.DSMT4">
                       <p:embed/>
                     </p:oleObj>
                   </mc:Choice>
@@ -22817,7 +22817,7 @@
               <a:graphicData uri="http://schemas.openxmlformats.org/presentationml/2006/ole">
                 <mc:AlternateContent xmlns:mc="http://schemas.openxmlformats.org/markup-compatibility/2006">
                   <mc:Choice xmlns:v="urn:schemas-microsoft-com:vml" Requires="v">
-                    <p:oleObj spid="_x0000_s14422" name="Equation" r:id="rId20" imgW="609480" imgH="241200" progId="Equation.DSMT4">
+                    <p:oleObj spid="_x0000_s14458" name="Equation" r:id="rId20" imgW="609480" imgH="241200" progId="Equation.DSMT4">
                       <p:embed/>
                     </p:oleObj>
                   </mc:Choice>
@@ -23045,7 +23045,7 @@
           <a:graphicData uri="http://schemas.openxmlformats.org/presentationml/2006/ole">
             <mc:AlternateContent xmlns:mc="http://schemas.openxmlformats.org/markup-compatibility/2006">
               <mc:Choice xmlns:v="urn:schemas-microsoft-com:vml" Requires="v">
-                <p:oleObj spid="_x0000_s1275" name="Equation" r:id="rId3" imgW="1143000" imgH="330120" progId="Equation.DSMT4">
+                <p:oleObj spid="_x0000_s1287" name="Equation" r:id="rId3" imgW="1143000" imgH="330120" progId="Equation.DSMT4">
                   <p:embed/>
                 </p:oleObj>
               </mc:Choice>
@@ -23102,7 +23102,7 @@
           <a:graphicData uri="http://schemas.openxmlformats.org/presentationml/2006/ole">
             <mc:AlternateContent xmlns:mc="http://schemas.openxmlformats.org/markup-compatibility/2006">
               <mc:Choice xmlns:v="urn:schemas-microsoft-com:vml" Requires="v">
-                <p:oleObj spid="_x0000_s1276" name="Equation" r:id="rId5" imgW="1244520" imgH="291960" progId="Equation.DSMT4">
+                <p:oleObj spid="_x0000_s1288" name="Equation" r:id="rId5" imgW="1244520" imgH="291960" progId="Equation.DSMT4">
                   <p:embed/>
                 </p:oleObj>
               </mc:Choice>
@@ -23189,7 +23189,7 @@
           <a:graphicData uri="http://schemas.openxmlformats.org/presentationml/2006/ole">
             <mc:AlternateContent xmlns:mc="http://schemas.openxmlformats.org/markup-compatibility/2006">
               <mc:Choice xmlns:v="urn:schemas-microsoft-com:vml" Requires="v">
-                <p:oleObj spid="_x0000_s1277" name="Equation" r:id="rId7" imgW="2286000" imgH="685800" progId="Equation.DSMT4">
+                <p:oleObj spid="_x0000_s1289" name="Equation" r:id="rId7" imgW="2286000" imgH="685800" progId="Equation.DSMT4">
                   <p:embed/>
                 </p:oleObj>
               </mc:Choice>
@@ -23259,7 +23259,7 @@
           <a:graphicData uri="http://schemas.openxmlformats.org/presentationml/2006/ole">
             <mc:AlternateContent xmlns:mc="http://schemas.openxmlformats.org/markup-compatibility/2006">
               <mc:Choice xmlns:v="urn:schemas-microsoft-com:vml" Requires="v">
-                <p:oleObj spid="_x0000_s1278" name="Equation" r:id="rId9" imgW="1396800" imgH="431640" progId="Equation.DSMT4">
+                <p:oleObj spid="_x0000_s1290" name="Equation" r:id="rId9" imgW="1396800" imgH="431640" progId="Equation.DSMT4">
                   <p:embed/>
                 </p:oleObj>
               </mc:Choice>
@@ -23649,7 +23649,7 @@
           <a:graphicData uri="http://schemas.openxmlformats.org/presentationml/2006/ole">
             <mc:AlternateContent xmlns:mc="http://schemas.openxmlformats.org/markup-compatibility/2006">
               <mc:Choice xmlns:v="urn:schemas-microsoft-com:vml" Requires="v">
-                <p:oleObj spid="_x0000_s13371" name="Equation" r:id="rId4" imgW="812520" imgH="253800" progId="Equation.DSMT4">
+                <p:oleObj spid="_x0000_s13380" name="Equation" r:id="rId4" imgW="812520" imgH="253800" progId="Equation.DSMT4">
                   <p:embed/>
                 </p:oleObj>
               </mc:Choice>
@@ -23712,7 +23712,7 @@
           <a:graphicData uri="http://schemas.openxmlformats.org/presentationml/2006/ole">
             <mc:AlternateContent xmlns:mc="http://schemas.openxmlformats.org/markup-compatibility/2006">
               <mc:Choice xmlns:v="urn:schemas-microsoft-com:vml" Requires="v">
-                <p:oleObj spid="_x0000_s13372" name="Equation" r:id="rId6" imgW="838080" imgH="253800" progId="Equation.DSMT4">
+                <p:oleObj spid="_x0000_s13381" name="Equation" r:id="rId6" imgW="838080" imgH="253800" progId="Equation.DSMT4">
                   <p:embed/>
                 </p:oleObj>
               </mc:Choice>
@@ -23775,7 +23775,7 @@
           <a:graphicData uri="http://schemas.openxmlformats.org/presentationml/2006/ole">
             <mc:AlternateContent xmlns:mc="http://schemas.openxmlformats.org/markup-compatibility/2006">
               <mc:Choice xmlns:v="urn:schemas-microsoft-com:vml" Requires="v">
-                <p:oleObj spid="_x0000_s13373" name="Equation" r:id="rId8" imgW="825480" imgH="253800" progId="Equation.DSMT4">
+                <p:oleObj spid="_x0000_s13382" name="Equation" r:id="rId8" imgW="825480" imgH="253800" progId="Equation.DSMT4">
                   <p:embed/>
                 </p:oleObj>
               </mc:Choice>
@@ -24149,7 +24149,7 @@
           <a:graphicData uri="http://schemas.openxmlformats.org/presentationml/2006/ole">
             <mc:AlternateContent xmlns:mc="http://schemas.openxmlformats.org/markup-compatibility/2006">
               <mc:Choice xmlns:v="urn:schemas-microsoft-com:vml" Requires="v">
-                <p:oleObj spid="_x0000_s2286" name="Equation" r:id="rId3" imgW="1231560" imgH="291960" progId="Equation.DSMT4">
+                <p:oleObj spid="_x0000_s2295" name="Equation" r:id="rId3" imgW="1231560" imgH="291960" progId="Equation.DSMT4">
                   <p:embed/>
                 </p:oleObj>
               </mc:Choice>
@@ -24206,7 +24206,7 @@
           <a:graphicData uri="http://schemas.openxmlformats.org/presentationml/2006/ole">
             <mc:AlternateContent xmlns:mc="http://schemas.openxmlformats.org/markup-compatibility/2006">
               <mc:Choice xmlns:v="urn:schemas-microsoft-com:vml" Requires="v">
-                <p:oleObj spid="_x0000_s2287" name="Equation" r:id="rId5" imgW="1282680" imgH="291960" progId="Equation.DSMT4">
+                <p:oleObj spid="_x0000_s2296" name="Equation" r:id="rId5" imgW="1282680" imgH="291960" progId="Equation.DSMT4">
                   <p:embed/>
                 </p:oleObj>
               </mc:Choice>
@@ -24300,7 +24300,7 @@
           <a:graphicData uri="http://schemas.openxmlformats.org/presentationml/2006/ole">
             <mc:AlternateContent xmlns:mc="http://schemas.openxmlformats.org/markup-compatibility/2006">
               <mc:Choice xmlns:v="urn:schemas-microsoft-com:vml" Requires="v">
-                <p:oleObj spid="_x0000_s2288" name="Equation" r:id="rId7" imgW="1854000" imgH="609480" progId="Equation.DSMT4">
+                <p:oleObj spid="_x0000_s2297" name="Equation" r:id="rId7" imgW="1854000" imgH="609480" progId="Equation.DSMT4">
                   <p:embed/>
                 </p:oleObj>
               </mc:Choice>
@@ -25088,7 +25088,7 @@
             <a:graphicData uri="http://schemas.openxmlformats.org/presentationml/2006/ole">
               <mc:AlternateContent xmlns:mc="http://schemas.openxmlformats.org/markup-compatibility/2006">
                 <mc:Choice xmlns:v="urn:schemas-microsoft-com:vml" Requires="v">
-                  <p:oleObj spid="_x0000_s15392" name="Equation" r:id="rId8" imgW="203040" imgH="253800" progId="Equation.DSMT4">
+                  <p:oleObj spid="_x0000_s15410" name="Equation" r:id="rId8" imgW="203040" imgH="253800" progId="Equation.DSMT4">
                     <p:embed/>
                   </p:oleObj>
                 </mc:Choice>
@@ -25448,7 +25448,7 @@
             <a:graphicData uri="http://schemas.openxmlformats.org/presentationml/2006/ole">
               <mc:AlternateContent xmlns:mc="http://schemas.openxmlformats.org/markup-compatibility/2006">
                 <mc:Choice xmlns:v="urn:schemas-microsoft-com:vml" Requires="v">
-                  <p:oleObj spid="_x0000_s15393" name="Equation" r:id="rId10" imgW="190440" imgH="228600" progId="Equation.DSMT4">
+                  <p:oleObj spid="_x0000_s15411" name="Equation" r:id="rId10" imgW="190440" imgH="228600" progId="Equation.DSMT4">
                     <p:embed/>
                   </p:oleObj>
                 </mc:Choice>
@@ -25517,7 +25517,7 @@
             <a:graphicData uri="http://schemas.openxmlformats.org/presentationml/2006/ole">
               <mc:AlternateContent xmlns:mc="http://schemas.openxmlformats.org/markup-compatibility/2006">
                 <mc:Choice xmlns:v="urn:schemas-microsoft-com:vml" Requires="v">
-                  <p:oleObj spid="_x0000_s15394" name="Equation" r:id="rId12" imgW="241200" imgH="253800" progId="Equation.DSMT4">
+                  <p:oleObj spid="_x0000_s15412" name="Equation" r:id="rId12" imgW="241200" imgH="253800" progId="Equation.DSMT4">
                     <p:embed/>
                   </p:oleObj>
                 </mc:Choice>
@@ -25606,7 +25606,7 @@
               <a:graphicData uri="http://schemas.openxmlformats.org/presentationml/2006/ole">
                 <mc:AlternateContent xmlns:mc="http://schemas.openxmlformats.org/markup-compatibility/2006">
                   <mc:Choice xmlns:v="urn:schemas-microsoft-com:vml" Requires="v">
-                    <p:oleObj spid="_x0000_s15395" name="Equation" r:id="rId14" imgW="596880" imgH="241200" progId="Equation.DSMT4">
+                    <p:oleObj spid="_x0000_s15413" name="Equation" r:id="rId14" imgW="596880" imgH="241200" progId="Equation.DSMT4">
                       <p:embed/>
                     </p:oleObj>
                   </mc:Choice>
@@ -25732,7 +25732,7 @@
               <a:graphicData uri="http://schemas.openxmlformats.org/presentationml/2006/ole">
                 <mc:AlternateContent xmlns:mc="http://schemas.openxmlformats.org/markup-compatibility/2006">
                   <mc:Choice xmlns:v="urn:schemas-microsoft-com:vml" Requires="v">
-                    <p:oleObj spid="_x0000_s15396" name="Equation" r:id="rId16" imgW="622080" imgH="241200" progId="Equation.DSMT4">
+                    <p:oleObj spid="_x0000_s15414" name="Equation" r:id="rId16" imgW="622080" imgH="241200" progId="Equation.DSMT4">
                       <p:embed/>
                     </p:oleObj>
                   </mc:Choice>
@@ -25858,7 +25858,7 @@
               <a:graphicData uri="http://schemas.openxmlformats.org/presentationml/2006/ole">
                 <mc:AlternateContent xmlns:mc="http://schemas.openxmlformats.org/markup-compatibility/2006">
                   <mc:Choice xmlns:v="urn:schemas-microsoft-com:vml" Requires="v">
-                    <p:oleObj spid="_x0000_s15397" name="Equation" r:id="rId18" imgW="609480" imgH="241200" progId="Equation.DSMT4">
+                    <p:oleObj spid="_x0000_s15415" name="Equation" r:id="rId18" imgW="609480" imgH="241200" progId="Equation.DSMT4">
                       <p:embed/>
                     </p:oleObj>
                   </mc:Choice>
@@ -26705,7 +26705,7 @@
           <a:graphicData uri="http://schemas.openxmlformats.org/presentationml/2006/ole">
             <mc:AlternateContent xmlns:mc="http://schemas.openxmlformats.org/markup-compatibility/2006">
               <mc:Choice xmlns:v="urn:schemas-microsoft-com:vml" Requires="v">
-                <p:oleObj spid="_x0000_s16392" name="Equation" r:id="rId5" imgW="393480" imgH="203040" progId="Equation.DSMT4">
+                <p:oleObj spid="_x0000_s16398" name="Equation" r:id="rId5" imgW="393480" imgH="203040" progId="Equation.DSMT4">
                   <p:embed/>
                 </p:oleObj>
               </mc:Choice>
@@ -26756,7 +26756,7 @@
           <a:graphicData uri="http://schemas.openxmlformats.org/presentationml/2006/ole">
             <mc:AlternateContent xmlns:mc="http://schemas.openxmlformats.org/markup-compatibility/2006">
               <mc:Choice xmlns:v="urn:schemas-microsoft-com:vml" Requires="v">
-                <p:oleObj spid="_x0000_s16393" name="Equation" r:id="rId7" imgW="355320" imgH="203040" progId="Equation.DSMT4">
+                <p:oleObj spid="_x0000_s16399" name="Equation" r:id="rId7" imgW="355320" imgH="203040" progId="Equation.DSMT4">
                   <p:embed/>
                 </p:oleObj>
               </mc:Choice>

</xml_diff>

<commit_message>
add icons to header; add coefplots example
</commit_message>
<xml_diff>
--- a/lectures/lecture2.pptx
+++ b/lectures/lecture2.pptx
@@ -319,7 +319,7 @@
           <a:p>
             <a:fld id="{88225CEC-B4DB-421E-BD7D-F5D0F79EA658}" type="datetimeFigureOut">
               <a:rPr lang="en-US" smtClean="0"/>
-              <a:t>3/8/2021</a:t>
+              <a:t>10/16/2021</a:t>
             </a:fld>
             <a:endParaRPr lang="en-US"/>
           </a:p>
@@ -849,7 +849,7 @@
           <a:p>
             <a:fld id="{2F895662-E2E6-47BC-B493-3EA4FCF734B6}" type="datetime1">
               <a:rPr lang="en-US" smtClean="0"/>
-              <a:t>3/8/2021</a:t>
+              <a:t>10/16/2021</a:t>
             </a:fld>
             <a:endParaRPr lang="en-US"/>
           </a:p>
@@ -1017,7 +1017,7 @@
           <a:p>
             <a:fld id="{0F4BFD65-5602-4172-B54C-6A65165A1845}" type="datetime1">
               <a:rPr lang="en-US" smtClean="0"/>
-              <a:t>3/8/2021</a:t>
+              <a:t>10/16/2021</a:t>
             </a:fld>
             <a:endParaRPr lang="en-US"/>
           </a:p>
@@ -1195,7 +1195,7 @@
           <a:p>
             <a:fld id="{6CA290DE-8138-4626-BC3F-DF68A3BD09D8}" type="datetime1">
               <a:rPr lang="en-US" smtClean="0"/>
-              <a:t>3/8/2021</a:t>
+              <a:t>10/16/2021</a:t>
             </a:fld>
             <a:endParaRPr lang="en-US"/>
           </a:p>
@@ -1363,7 +1363,7 @@
           <a:p>
             <a:fld id="{E1BE8E3F-75DF-45E8-9F6B-4F2E22494A32}" type="datetime1">
               <a:rPr lang="en-US" smtClean="0"/>
-              <a:t>3/8/2021</a:t>
+              <a:t>10/16/2021</a:t>
             </a:fld>
             <a:endParaRPr lang="en-US"/>
           </a:p>
@@ -1608,7 +1608,7 @@
           <a:p>
             <a:fld id="{82F4DA82-3E7C-4CFB-A30B-53D3893EF32E}" type="datetime1">
               <a:rPr lang="en-US" smtClean="0"/>
-              <a:t>3/8/2021</a:t>
+              <a:t>10/16/2021</a:t>
             </a:fld>
             <a:endParaRPr lang="en-US"/>
           </a:p>
@@ -1893,7 +1893,7 @@
           <a:p>
             <a:fld id="{36B3D8AD-4C83-4D73-AEE7-5E801ED5356C}" type="datetime1">
               <a:rPr lang="en-US" smtClean="0"/>
-              <a:t>3/8/2021</a:t>
+              <a:t>10/16/2021</a:t>
             </a:fld>
             <a:endParaRPr lang="en-US"/>
           </a:p>
@@ -2312,7 +2312,7 @@
           <a:p>
             <a:fld id="{7E6893DB-DD64-49D6-A5C2-F6ACE2B1530B}" type="datetime1">
               <a:rPr lang="en-US" smtClean="0"/>
-              <a:t>3/8/2021</a:t>
+              <a:t>10/16/2021</a:t>
             </a:fld>
             <a:endParaRPr lang="en-US"/>
           </a:p>
@@ -2429,7 +2429,7 @@
           <a:p>
             <a:fld id="{FC0A94C3-7A0F-4E28-9A06-985C13FFBB01}" type="datetime1">
               <a:rPr lang="en-US" smtClean="0"/>
-              <a:t>3/8/2021</a:t>
+              <a:t>10/16/2021</a:t>
             </a:fld>
             <a:endParaRPr lang="en-US"/>
           </a:p>
@@ -2524,7 +2524,7 @@
           <a:p>
             <a:fld id="{8587B2D3-0011-41C0-B2C5-6B713844DB1C}" type="datetime1">
               <a:rPr lang="en-US" smtClean="0"/>
-              <a:t>3/8/2021</a:t>
+              <a:t>10/16/2021</a:t>
             </a:fld>
             <a:endParaRPr lang="en-US"/>
           </a:p>
@@ -2799,7 +2799,7 @@
           <a:p>
             <a:fld id="{B53EE19A-9EFD-417C-93CE-FC2F485F3533}" type="datetime1">
               <a:rPr lang="en-US" smtClean="0"/>
-              <a:t>3/8/2021</a:t>
+              <a:t>10/16/2021</a:t>
             </a:fld>
             <a:endParaRPr lang="en-US"/>
           </a:p>
@@ -3054,7 +3054,7 @@
           <a:p>
             <a:fld id="{87D9954C-8CD1-4968-8DFE-C7948C62F830}" type="datetime1">
               <a:rPr lang="en-US" smtClean="0"/>
-              <a:t>3/8/2021</a:t>
+              <a:t>10/16/2021</a:t>
             </a:fld>
             <a:endParaRPr lang="en-US"/>
           </a:p>
@@ -3270,7 +3270,7 @@
           <a:p>
             <a:fld id="{B4BF092D-FE75-4F27-B0C3-A897761F708C}" type="datetime1">
               <a:rPr lang="en-US" smtClean="0"/>
-              <a:t>3/8/2021</a:t>
+              <a:t>10/16/2021</a:t>
             </a:fld>
             <a:endParaRPr lang="en-US"/>
           </a:p>
@@ -3736,7 +3736,7 @@
           <a:p>
             <a:r>
               <a:rPr lang="en-US" dirty="0"/>
-              <a:t>March, 2021</a:t>
+              <a:t>Oct-Nov 2021</a:t>
             </a:r>
           </a:p>
           <a:p>
@@ -4183,7 +4183,7 @@
           <a:graphicData uri="http://schemas.openxmlformats.org/presentationml/2006/ole">
             <mc:AlternateContent xmlns:mc="http://schemas.openxmlformats.org/markup-compatibility/2006">
               <mc:Choice xmlns:v="urn:schemas-microsoft-com:vml" Requires="v">
-                <p:oleObj spid="_x0000_s3296" name="Equation" r:id="rId3" imgW="139680" imgH="203040" progId="Equation.DSMT4">
+                <p:oleObj spid="_x0000_s3308" name="Equation" r:id="rId3" imgW="139680" imgH="203040" progId="Equation.DSMT4">
                   <p:embed/>
                 </p:oleObj>
               </mc:Choice>
@@ -4240,7 +4240,7 @@
           <a:graphicData uri="http://schemas.openxmlformats.org/presentationml/2006/ole">
             <mc:AlternateContent xmlns:mc="http://schemas.openxmlformats.org/markup-compatibility/2006">
               <mc:Choice xmlns:v="urn:schemas-microsoft-com:vml" Requires="v">
-                <p:oleObj spid="_x0000_s3297" name="Equation" r:id="rId5" imgW="2450880" imgH="253800" progId="Equation.DSMT4">
+                <p:oleObj spid="_x0000_s3309" name="Equation" r:id="rId5" imgW="2450880" imgH="253800" progId="Equation.DSMT4">
                   <p:embed/>
                 </p:oleObj>
               </mc:Choice>
@@ -4297,7 +4297,7 @@
           <a:graphicData uri="http://schemas.openxmlformats.org/presentationml/2006/ole">
             <mc:AlternateContent xmlns:mc="http://schemas.openxmlformats.org/markup-compatibility/2006">
               <mc:Choice xmlns:v="urn:schemas-microsoft-com:vml" Requires="v">
-                <p:oleObj spid="_x0000_s3298" name="Equation" r:id="rId7" imgW="164880" imgH="228600" progId="Equation.DSMT4">
+                <p:oleObj spid="_x0000_s3310" name="Equation" r:id="rId7" imgW="164880" imgH="228600" progId="Equation.DSMT4">
                   <p:embed/>
                 </p:oleObj>
               </mc:Choice>
@@ -4434,7 +4434,7 @@
           <a:graphicData uri="http://schemas.openxmlformats.org/presentationml/2006/ole">
             <mc:AlternateContent xmlns:mc="http://schemas.openxmlformats.org/markup-compatibility/2006">
               <mc:Choice xmlns:v="urn:schemas-microsoft-com:vml" Requires="v">
-                <p:oleObj spid="_x0000_s3299" name="Equation" r:id="rId3" imgW="139680" imgH="203040" progId="Equation.DSMT4">
+                <p:oleObj spid="_x0000_s3311" name="Equation" r:id="rId3" imgW="139680" imgH="203040" progId="Equation.DSMT4">
                   <p:embed/>
                 </p:oleObj>
               </mc:Choice>
@@ -5934,7 +5934,7 @@
               <a:rPr lang="en-US" smtClean="0"/>
               <a:t>13</a:t>
             </a:fld>
-            <a:endParaRPr lang="en-US"/>
+            <a:endParaRPr lang="en-US" dirty="0"/>
           </a:p>
         </p:txBody>
       </p:sp>
@@ -7367,6 +7367,96 @@
           </a:p>
         </p:txBody>
       </p:sp>
+      <p:sp>
+        <p:nvSpPr>
+          <p:cNvPr id="5" name="Rectangle 4">
+            <a:extLst>
+              <a:ext uri="{FF2B5EF4-FFF2-40B4-BE49-F238E27FC236}">
+                <a16:creationId xmlns:a16="http://schemas.microsoft.com/office/drawing/2014/main" id="{499428D8-2B9C-4934-A3C7-12534C4C4797}"/>
+              </a:ext>
+            </a:extLst>
+          </p:cNvPr>
+          <p:cNvSpPr/>
+          <p:nvPr/>
+        </p:nvSpPr>
+        <p:spPr>
+          <a:xfrm>
+            <a:off x="4389097" y="1423644"/>
+            <a:ext cx="365805" cy="369332"/>
+          </a:xfrm>
+          <a:prstGeom prst="rect">
+            <a:avLst/>
+          </a:prstGeom>
+        </p:spPr>
+        <p:txBody>
+          <a:bodyPr wrap="square">
+            <a:spAutoFit/>
+          </a:bodyPr>
+          <a:lstStyle/>
+          <a:p>
+            <a:pPr lvl="0" algn="ctr"/>
+            <a:r>
+              <a:rPr lang="en-US" dirty="0">
+                <a:solidFill>
+                  <a:srgbClr val="00B050"/>
+                </a:solidFill>
+                <a:sym typeface="Wingdings"/>
+              </a:rPr>
+              <a:t></a:t>
+            </a:r>
+            <a:endParaRPr lang="en-US" dirty="0">
+              <a:solidFill>
+                <a:prstClr val="black"/>
+              </a:solidFill>
+            </a:endParaRPr>
+          </a:p>
+        </p:txBody>
+      </p:sp>
+      <p:sp>
+        <p:nvSpPr>
+          <p:cNvPr id="9" name="Rectangle 8">
+            <a:extLst>
+              <a:ext uri="{FF2B5EF4-FFF2-40B4-BE49-F238E27FC236}">
+                <a16:creationId xmlns:a16="http://schemas.microsoft.com/office/drawing/2014/main" id="{3DDD48AC-E425-4CA4-A0F5-E2BA34952015}"/>
+              </a:ext>
+            </a:extLst>
+          </p:cNvPr>
+          <p:cNvSpPr/>
+          <p:nvPr/>
+        </p:nvSpPr>
+        <p:spPr>
+          <a:xfrm>
+            <a:off x="4396873" y="1642182"/>
+            <a:ext cx="365805" cy="369332"/>
+          </a:xfrm>
+          <a:prstGeom prst="rect">
+            <a:avLst/>
+          </a:prstGeom>
+        </p:spPr>
+        <p:txBody>
+          <a:bodyPr wrap="none">
+            <a:spAutoFit/>
+          </a:bodyPr>
+          <a:lstStyle/>
+          <a:p>
+            <a:pPr lvl="0" algn="ctr"/>
+            <a:r>
+              <a:rPr lang="en-US" dirty="0">
+                <a:solidFill>
+                  <a:srgbClr val="00B050"/>
+                </a:solidFill>
+                <a:sym typeface="Wingdings"/>
+              </a:rPr>
+              <a:t></a:t>
+            </a:r>
+            <a:endParaRPr lang="en-US" dirty="0">
+              <a:solidFill>
+                <a:prstClr val="black"/>
+              </a:solidFill>
+            </a:endParaRPr>
+          </a:p>
+        </p:txBody>
+      </p:sp>
     </p:spTree>
     <p:extLst>
       <p:ext uri="{BB962C8B-B14F-4D97-AF65-F5344CB8AC3E}">
@@ -7654,7 +7744,7 @@
           <a:graphicData uri="http://schemas.openxmlformats.org/presentationml/2006/ole">
             <mc:AlternateContent xmlns:mc="http://schemas.openxmlformats.org/markup-compatibility/2006">
               <mc:Choice xmlns:v="urn:schemas-microsoft-com:vml" Requires="v">
-                <p:oleObj spid="_x0000_s4240" name="Equation" r:id="rId5" imgW="393480" imgH="203040" progId="Equation.DSMT4">
+                <p:oleObj spid="_x0000_s4246" name="Equation" r:id="rId5" imgW="393480" imgH="203040" progId="Equation.DSMT4">
                   <p:embed/>
                 </p:oleObj>
               </mc:Choice>
@@ -7711,7 +7801,7 @@
           <a:graphicData uri="http://schemas.openxmlformats.org/presentationml/2006/ole">
             <mc:AlternateContent xmlns:mc="http://schemas.openxmlformats.org/markup-compatibility/2006">
               <mc:Choice xmlns:v="urn:schemas-microsoft-com:vml" Requires="v">
-                <p:oleObj spid="_x0000_s4241" name="Equation" r:id="rId7" imgW="355320" imgH="203040" progId="Equation.DSMT4">
+                <p:oleObj spid="_x0000_s4247" name="Equation" r:id="rId7" imgW="355320" imgH="203040" progId="Equation.DSMT4">
                   <p:embed/>
                 </p:oleObj>
               </mc:Choice>
@@ -9336,7 +9426,7 @@
           <a:graphicData uri="http://schemas.openxmlformats.org/presentationml/2006/ole">
             <mc:AlternateContent xmlns:mc="http://schemas.openxmlformats.org/markup-compatibility/2006">
               <mc:Choice xmlns:v="urn:schemas-microsoft-com:vml" Requires="v">
-                <p:oleObj spid="_x0000_s5181" name="Equation" r:id="rId5" imgW="1104840" imgH="304560" progId="Equation.DSMT4">
+                <p:oleObj spid="_x0000_s5184" name="Equation" r:id="rId5" imgW="1104840" imgH="304560" progId="Equation.DSMT4">
                   <p:embed/>
                 </p:oleObj>
               </mc:Choice>
@@ -9838,7 +9928,7 @@
           <a:graphicData uri="http://schemas.openxmlformats.org/presentationml/2006/ole">
             <mc:AlternateContent xmlns:mc="http://schemas.openxmlformats.org/markup-compatibility/2006">
               <mc:Choice xmlns:v="urn:schemas-microsoft-com:vml" Requires="v">
-                <p:oleObj spid="_x0000_s11308" name="Equation" r:id="rId9" imgW="1231560" imgH="291960" progId="Equation.DSMT4">
+                <p:oleObj spid="_x0000_s11311" name="Equation" r:id="rId9" imgW="1231560" imgH="291960" progId="Equation.DSMT4">
                   <p:embed/>
                 </p:oleObj>
               </mc:Choice>
@@ -11038,7 +11128,7 @@
           <a:graphicData uri="http://schemas.openxmlformats.org/presentationml/2006/ole">
             <mc:AlternateContent xmlns:mc="http://schemas.openxmlformats.org/markup-compatibility/2006">
               <mc:Choice xmlns:v="urn:schemas-microsoft-com:vml" Requires="v">
-                <p:oleObj spid="_x0000_s7228" name="Equation" r:id="rId6" imgW="1676160" imgH="304560" progId="Equation.DSMT4">
+                <p:oleObj spid="_x0000_s7231" name="Equation" r:id="rId6" imgW="1676160" imgH="304560" progId="Equation.DSMT4">
                   <p:embed/>
                 </p:oleObj>
               </mc:Choice>
@@ -11617,7 +11707,7 @@
           <a:graphicData uri="http://schemas.openxmlformats.org/presentationml/2006/ole">
             <mc:AlternateContent xmlns:mc="http://schemas.openxmlformats.org/markup-compatibility/2006">
               <mc:Choice xmlns:v="urn:schemas-microsoft-com:vml" Requires="v">
-                <p:oleObj spid="_x0000_s6207" name="Equation" r:id="rId3" imgW="1104840" imgH="304560" progId="Equation.DSMT4">
+                <p:oleObj spid="_x0000_s6210" name="Equation" r:id="rId3" imgW="1104840" imgH="304560" progId="Equation.DSMT4">
                   <p:embed/>
                 </p:oleObj>
               </mc:Choice>
@@ -12297,7 +12387,7 @@
           <a:graphicData uri="http://schemas.openxmlformats.org/presentationml/2006/ole">
             <mc:AlternateContent xmlns:mc="http://schemas.openxmlformats.org/markup-compatibility/2006">
               <mc:Choice xmlns:v="urn:schemas-microsoft-com:vml" Requires="v">
-                <p:oleObj spid="_x0000_s12328" name="Equation" r:id="rId3" imgW="1676160" imgH="304560" progId="Equation.DSMT4">
+                <p:oleObj spid="_x0000_s12331" name="Equation" r:id="rId3" imgW="1676160" imgH="304560" progId="Equation.DSMT4">
                   <p:embed/>
                 </p:oleObj>
               </mc:Choice>
@@ -12915,6 +13005,58 @@
               <a:rPr lang="en-US" sz="1600" dirty="0"/>
               <a:t>The canonical dimension is Can1 = 0.075 WP - 0.083 BM, a contrast between the two tests</a:t>
             </a:r>
+          </a:p>
+        </p:txBody>
+      </p:sp>
+      <p:sp>
+        <p:nvSpPr>
+          <p:cNvPr id="6" name="Oval 5">
+            <a:extLst>
+              <a:ext uri="{FF2B5EF4-FFF2-40B4-BE49-F238E27FC236}">
+                <a16:creationId xmlns:a16="http://schemas.microsoft.com/office/drawing/2014/main" id="{B6BE69F0-B4F3-4D6B-AD8E-0C1628AC2F4D}"/>
+              </a:ext>
+            </a:extLst>
+          </p:cNvPr>
+          <p:cNvSpPr/>
+          <p:nvPr/>
+        </p:nvSpPr>
+        <p:spPr>
+          <a:xfrm>
+            <a:off x="914400" y="5085556"/>
+            <a:ext cx="1219200" cy="629444"/>
+          </a:xfrm>
+          <a:prstGeom prst="ellipse">
+            <a:avLst/>
+          </a:prstGeom>
+          <a:noFill/>
+          <a:ln>
+            <a:solidFill>
+              <a:srgbClr val="FF0000"/>
+            </a:solidFill>
+          </a:ln>
+        </p:spPr>
+        <p:style>
+          <a:lnRef idx="2">
+            <a:schemeClr val="accent1">
+              <a:shade val="50000"/>
+            </a:schemeClr>
+          </a:lnRef>
+          <a:fillRef idx="1">
+            <a:schemeClr val="accent1"/>
+          </a:fillRef>
+          <a:effectRef idx="0">
+            <a:schemeClr val="accent1"/>
+          </a:effectRef>
+          <a:fontRef idx="minor">
+            <a:schemeClr val="lt1"/>
+          </a:fontRef>
+        </p:style>
+        <p:txBody>
+          <a:bodyPr rtlCol="0" anchor="ctr"/>
+          <a:lstStyle/>
+          <a:p>
+            <a:pPr algn="ctr"/>
+            <a:endParaRPr lang="en-US"/>
           </a:p>
         </p:txBody>
       </p:sp>
@@ -14938,13 +15080,15 @@
               </a:ext>
             </a:extLst>
           </p:cNvPr>
-          <p:cNvCxnSpPr/>
+          <p:cNvCxnSpPr>
+            <a:cxnSpLocks/>
+          </p:cNvCxnSpPr>
           <p:nvPr/>
         </p:nvCxnSpPr>
         <p:spPr>
           <a:xfrm flipV="1">
-            <a:off x="2168525" y="4114800"/>
-            <a:ext cx="2098675" cy="1524000"/>
+            <a:off x="2133600" y="4153676"/>
+            <a:ext cx="2209800" cy="1295400"/>
           </a:xfrm>
           <a:prstGeom prst="straightConnector1">
             <a:avLst/>
@@ -22541,7 +22685,7 @@
             <a:graphicData uri="http://schemas.openxmlformats.org/presentationml/2006/ole">
               <mc:AlternateContent xmlns:mc="http://schemas.openxmlformats.org/markup-compatibility/2006">
                 <mc:Choice xmlns:v="urn:schemas-microsoft-com:vml" Requires="v">
-                  <p:oleObj spid="_x0000_s14555" name="Equation" r:id="rId3" imgW="203040" imgH="253800" progId="Equation.DSMT4">
+                  <p:oleObj spid="_x0000_s14591" name="Equation" r:id="rId3" imgW="203040" imgH="253800" progId="Equation.DSMT4">
                     <p:embed/>
                   </p:oleObj>
                 </mc:Choice>
@@ -22915,7 +23059,7 @@
               <a:graphicData uri="http://schemas.openxmlformats.org/presentationml/2006/ole">
                 <mc:AlternateContent xmlns:mc="http://schemas.openxmlformats.org/markup-compatibility/2006">
                   <mc:Choice xmlns:v="urn:schemas-microsoft-com:vml" Requires="v">
-                    <p:oleObj spid="_x0000_s14556" name="Equation" r:id="rId5" imgW="190440" imgH="228600" progId="Equation.DSMT4">
+                    <p:oleObj spid="_x0000_s14592" name="Equation" r:id="rId5" imgW="190440" imgH="228600" progId="Equation.DSMT4">
                       <p:embed/>
                     </p:oleObj>
                   </mc:Choice>
@@ -22978,7 +23122,7 @@
               <a:graphicData uri="http://schemas.openxmlformats.org/presentationml/2006/ole">
                 <mc:AlternateContent xmlns:mc="http://schemas.openxmlformats.org/markup-compatibility/2006">
                   <mc:Choice xmlns:v="urn:schemas-microsoft-com:vml" Requires="v">
-                    <p:oleObj spid="_x0000_s14557" name="Equation" r:id="rId7" imgW="241200" imgH="253800" progId="Equation.DSMT4">
+                    <p:oleObj spid="_x0000_s14593" name="Equation" r:id="rId7" imgW="241200" imgH="253800" progId="Equation.DSMT4">
                       <p:embed/>
                     </p:oleObj>
                   </mc:Choice>
@@ -23061,7 +23205,7 @@
                 <a:graphicData uri="http://schemas.openxmlformats.org/presentationml/2006/ole">
                   <mc:AlternateContent xmlns:mc="http://schemas.openxmlformats.org/markup-compatibility/2006">
                     <mc:Choice xmlns:v="urn:schemas-microsoft-com:vml" Requires="v">
-                      <p:oleObj spid="_x0000_s14558" name="Equation" r:id="rId9" imgW="596880" imgH="241200" progId="Equation.DSMT4">
+                      <p:oleObj spid="_x0000_s14594" name="Equation" r:id="rId9" imgW="596880" imgH="241200" progId="Equation.DSMT4">
                         <p:embed/>
                       </p:oleObj>
                     </mc:Choice>
@@ -23187,7 +23331,7 @@
                 <a:graphicData uri="http://schemas.openxmlformats.org/presentationml/2006/ole">
                   <mc:AlternateContent xmlns:mc="http://schemas.openxmlformats.org/markup-compatibility/2006">
                     <mc:Choice xmlns:v="urn:schemas-microsoft-com:vml" Requires="v">
-                      <p:oleObj spid="_x0000_s14559" name="Equation" r:id="rId11" imgW="622080" imgH="241200" progId="Equation.DSMT4">
+                      <p:oleObj spid="_x0000_s14595" name="Equation" r:id="rId11" imgW="622080" imgH="241200" progId="Equation.DSMT4">
                         <p:embed/>
                       </p:oleObj>
                     </mc:Choice>
@@ -23313,7 +23457,7 @@
                 <a:graphicData uri="http://schemas.openxmlformats.org/presentationml/2006/ole">
                   <mc:AlternateContent xmlns:mc="http://schemas.openxmlformats.org/markup-compatibility/2006">
                     <mc:Choice xmlns:v="urn:schemas-microsoft-com:vml" Requires="v">
-                      <p:oleObj spid="_x0000_s14560" name="Equation" r:id="rId13" imgW="609480" imgH="241200" progId="Equation.DSMT4">
+                      <p:oleObj spid="_x0000_s14596" name="Equation" r:id="rId13" imgW="609480" imgH="241200" progId="Equation.DSMT4">
                         <p:embed/>
                       </p:oleObj>
                     </mc:Choice>
@@ -23441,7 +23585,7 @@
             <a:graphicData uri="http://schemas.openxmlformats.org/presentationml/2006/ole">
               <mc:AlternateContent xmlns:mc="http://schemas.openxmlformats.org/markup-compatibility/2006">
                 <mc:Choice xmlns:v="urn:schemas-microsoft-com:vml" Requires="v">
-                  <p:oleObj spid="_x0000_s14561" name="Equation" r:id="rId15" imgW="203040" imgH="253800" progId="Equation.DSMT4">
+                  <p:oleObj spid="_x0000_s14597" name="Equation" r:id="rId15" imgW="203040" imgH="253800" progId="Equation.DSMT4">
                     <p:embed/>
                   </p:oleObj>
                 </mc:Choice>
@@ -23801,7 +23945,7 @@
             <a:graphicData uri="http://schemas.openxmlformats.org/presentationml/2006/ole">
               <mc:AlternateContent xmlns:mc="http://schemas.openxmlformats.org/markup-compatibility/2006">
                 <mc:Choice xmlns:v="urn:schemas-microsoft-com:vml" Requires="v">
-                  <p:oleObj spid="_x0000_s14562" name="Equation" r:id="rId16" imgW="190440" imgH="228600" progId="Equation.DSMT4">
+                  <p:oleObj spid="_x0000_s14598" name="Equation" r:id="rId16" imgW="190440" imgH="228600" progId="Equation.DSMT4">
                     <p:embed/>
                   </p:oleObj>
                 </mc:Choice>
@@ -23870,7 +24014,7 @@
             <a:graphicData uri="http://schemas.openxmlformats.org/presentationml/2006/ole">
               <mc:AlternateContent xmlns:mc="http://schemas.openxmlformats.org/markup-compatibility/2006">
                 <mc:Choice xmlns:v="urn:schemas-microsoft-com:vml" Requires="v">
-                  <p:oleObj spid="_x0000_s14563" name="Equation" r:id="rId17" imgW="241200" imgH="253800" progId="Equation.DSMT4">
+                  <p:oleObj spid="_x0000_s14599" name="Equation" r:id="rId17" imgW="241200" imgH="253800" progId="Equation.DSMT4">
                     <p:embed/>
                   </p:oleObj>
                 </mc:Choice>
@@ -23959,7 +24103,7 @@
               <a:graphicData uri="http://schemas.openxmlformats.org/presentationml/2006/ole">
                 <mc:AlternateContent xmlns:mc="http://schemas.openxmlformats.org/markup-compatibility/2006">
                   <mc:Choice xmlns:v="urn:schemas-microsoft-com:vml" Requires="v">
-                    <p:oleObj spid="_x0000_s14564" name="Equation" r:id="rId18" imgW="596880" imgH="241200" progId="Equation.DSMT4">
+                    <p:oleObj spid="_x0000_s14600" name="Equation" r:id="rId18" imgW="596880" imgH="241200" progId="Equation.DSMT4">
                       <p:embed/>
                     </p:oleObj>
                   </mc:Choice>
@@ -24085,7 +24229,7 @@
               <a:graphicData uri="http://schemas.openxmlformats.org/presentationml/2006/ole">
                 <mc:AlternateContent xmlns:mc="http://schemas.openxmlformats.org/markup-compatibility/2006">
                   <mc:Choice xmlns:v="urn:schemas-microsoft-com:vml" Requires="v">
-                    <p:oleObj spid="_x0000_s14565" name="Equation" r:id="rId19" imgW="622080" imgH="241200" progId="Equation.DSMT4">
+                    <p:oleObj spid="_x0000_s14601" name="Equation" r:id="rId19" imgW="622080" imgH="241200" progId="Equation.DSMT4">
                       <p:embed/>
                     </p:oleObj>
                   </mc:Choice>
@@ -24211,7 +24355,7 @@
               <a:graphicData uri="http://schemas.openxmlformats.org/presentationml/2006/ole">
                 <mc:AlternateContent xmlns:mc="http://schemas.openxmlformats.org/markup-compatibility/2006">
                   <mc:Choice xmlns:v="urn:schemas-microsoft-com:vml" Requires="v">
-                    <p:oleObj spid="_x0000_s14566" name="Equation" r:id="rId20" imgW="609480" imgH="241200" progId="Equation.DSMT4">
+                    <p:oleObj spid="_x0000_s14602" name="Equation" r:id="rId20" imgW="609480" imgH="241200" progId="Equation.DSMT4">
                       <p:embed/>
                     </p:oleObj>
                   </mc:Choice>
@@ -24439,7 +24583,7 @@
           <a:graphicData uri="http://schemas.openxmlformats.org/presentationml/2006/ole">
             <mc:AlternateContent xmlns:mc="http://schemas.openxmlformats.org/markup-compatibility/2006">
               <mc:Choice xmlns:v="urn:schemas-microsoft-com:vml" Requires="v">
-                <p:oleObj spid="_x0000_s1330" name="Equation" r:id="rId3" imgW="1143000" imgH="330120" progId="Equation.DSMT4">
+                <p:oleObj spid="_x0000_s1345" name="Equation" r:id="rId3" imgW="1143000" imgH="330120" progId="Equation.DSMT4">
                   <p:embed/>
                 </p:oleObj>
               </mc:Choice>
@@ -24496,7 +24640,7 @@
           <a:graphicData uri="http://schemas.openxmlformats.org/presentationml/2006/ole">
             <mc:AlternateContent xmlns:mc="http://schemas.openxmlformats.org/markup-compatibility/2006">
               <mc:Choice xmlns:v="urn:schemas-microsoft-com:vml" Requires="v">
-                <p:oleObj spid="_x0000_s1331" name="Equation" r:id="rId5" imgW="1244520" imgH="291960" progId="Equation.DSMT4">
+                <p:oleObj spid="_x0000_s1346" name="Equation" r:id="rId5" imgW="1244520" imgH="291960" progId="Equation.DSMT4">
                   <p:embed/>
                 </p:oleObj>
               </mc:Choice>
@@ -24583,7 +24727,7 @@
           <a:graphicData uri="http://schemas.openxmlformats.org/presentationml/2006/ole">
             <mc:AlternateContent xmlns:mc="http://schemas.openxmlformats.org/markup-compatibility/2006">
               <mc:Choice xmlns:v="urn:schemas-microsoft-com:vml" Requires="v">
-                <p:oleObj spid="_x0000_s1332" name="Equation" r:id="rId7" imgW="2286000" imgH="685800" progId="Equation.DSMT4">
+                <p:oleObj spid="_x0000_s1347" name="Equation" r:id="rId7" imgW="2286000" imgH="685800" progId="Equation.DSMT4">
                   <p:embed/>
                 </p:oleObj>
               </mc:Choice>
@@ -24653,7 +24797,7 @@
           <a:graphicData uri="http://schemas.openxmlformats.org/presentationml/2006/ole">
             <mc:AlternateContent xmlns:mc="http://schemas.openxmlformats.org/markup-compatibility/2006">
               <mc:Choice xmlns:v="urn:schemas-microsoft-com:vml" Requires="v">
-                <p:oleObj spid="_x0000_s1333" name="Equation" r:id="rId9" imgW="1396800" imgH="431640" progId="Equation.DSMT4">
+                <p:oleObj spid="_x0000_s1348" name="Equation" r:id="rId9" imgW="1396800" imgH="431640" progId="Equation.DSMT4">
                   <p:embed/>
                 </p:oleObj>
               </mc:Choice>
@@ -24864,7 +25008,7 @@
           <a:graphicData uri="http://schemas.openxmlformats.org/presentationml/2006/ole">
             <mc:AlternateContent xmlns:mc="http://schemas.openxmlformats.org/markup-compatibility/2006">
               <mc:Choice xmlns:v="urn:schemas-microsoft-com:vml" Requires="v">
-                <p:oleObj spid="_x0000_s1334" name="Equation" r:id="rId11" imgW="2425680" imgH="241200" progId="Equation.DSMT4">
+                <p:oleObj spid="_x0000_s1349" name="Equation" r:id="rId11" imgW="2425680" imgH="241200" progId="Equation.DSMT4">
                   <p:embed/>
                 </p:oleObj>
               </mc:Choice>
@@ -25106,7 +25250,7 @@
           <a:graphicData uri="http://schemas.openxmlformats.org/presentationml/2006/ole">
             <mc:AlternateContent xmlns:mc="http://schemas.openxmlformats.org/markup-compatibility/2006">
               <mc:Choice xmlns:v="urn:schemas-microsoft-com:vml" Requires="v">
-                <p:oleObj spid="_x0000_s13407" name="Equation" r:id="rId4" imgW="812520" imgH="253800" progId="Equation.DSMT4">
+                <p:oleObj spid="_x0000_s13416" name="Equation" r:id="rId4" imgW="812520" imgH="253800" progId="Equation.DSMT4">
                   <p:embed/>
                 </p:oleObj>
               </mc:Choice>
@@ -25169,7 +25313,7 @@
           <a:graphicData uri="http://schemas.openxmlformats.org/presentationml/2006/ole">
             <mc:AlternateContent xmlns:mc="http://schemas.openxmlformats.org/markup-compatibility/2006">
               <mc:Choice xmlns:v="urn:schemas-microsoft-com:vml" Requires="v">
-                <p:oleObj spid="_x0000_s13408" name="Equation" r:id="rId6" imgW="838080" imgH="253800" progId="Equation.DSMT4">
+                <p:oleObj spid="_x0000_s13417" name="Equation" r:id="rId6" imgW="838080" imgH="253800" progId="Equation.DSMT4">
                   <p:embed/>
                 </p:oleObj>
               </mc:Choice>
@@ -25232,7 +25376,7 @@
           <a:graphicData uri="http://schemas.openxmlformats.org/presentationml/2006/ole">
             <mc:AlternateContent xmlns:mc="http://schemas.openxmlformats.org/markup-compatibility/2006">
               <mc:Choice xmlns:v="urn:schemas-microsoft-com:vml" Requires="v">
-                <p:oleObj spid="_x0000_s13409" name="Equation" r:id="rId8" imgW="825480" imgH="253800" progId="Equation.DSMT4">
+                <p:oleObj spid="_x0000_s13418" name="Equation" r:id="rId8" imgW="825480" imgH="253800" progId="Equation.DSMT4">
                   <p:embed/>
                 </p:oleObj>
               </mc:Choice>
@@ -25771,7 +25915,7 @@
           <a:graphicData uri="http://schemas.openxmlformats.org/presentationml/2006/ole">
             <mc:AlternateContent xmlns:mc="http://schemas.openxmlformats.org/markup-compatibility/2006">
               <mc:Choice xmlns:v="urn:schemas-microsoft-com:vml" Requires="v">
-                <p:oleObj spid="_x0000_s2322" name="Equation" r:id="rId3" imgW="1231560" imgH="291960" progId="Equation.DSMT4">
+                <p:oleObj spid="_x0000_s2331" name="Equation" r:id="rId3" imgW="1231560" imgH="291960" progId="Equation.DSMT4">
                   <p:embed/>
                 </p:oleObj>
               </mc:Choice>
@@ -25828,7 +25972,7 @@
           <a:graphicData uri="http://schemas.openxmlformats.org/presentationml/2006/ole">
             <mc:AlternateContent xmlns:mc="http://schemas.openxmlformats.org/markup-compatibility/2006">
               <mc:Choice xmlns:v="urn:schemas-microsoft-com:vml" Requires="v">
-                <p:oleObj spid="_x0000_s2323" name="Equation" r:id="rId5" imgW="1282680" imgH="291960" progId="Equation.DSMT4">
+                <p:oleObj spid="_x0000_s2332" name="Equation" r:id="rId5" imgW="1282680" imgH="291960" progId="Equation.DSMT4">
                   <p:embed/>
                 </p:oleObj>
               </mc:Choice>
@@ -25922,7 +26066,7 @@
           <a:graphicData uri="http://schemas.openxmlformats.org/presentationml/2006/ole">
             <mc:AlternateContent xmlns:mc="http://schemas.openxmlformats.org/markup-compatibility/2006">
               <mc:Choice xmlns:v="urn:schemas-microsoft-com:vml" Requires="v">
-                <p:oleObj spid="_x0000_s2324" name="Equation" r:id="rId7" imgW="1854000" imgH="609480" progId="Equation.DSMT4">
+                <p:oleObj spid="_x0000_s2333" name="Equation" r:id="rId7" imgW="1854000" imgH="609480" progId="Equation.DSMT4">
                   <p:embed/>
                 </p:oleObj>
               </mc:Choice>
@@ -26710,7 +26854,7 @@
             <a:graphicData uri="http://schemas.openxmlformats.org/presentationml/2006/ole">
               <mc:AlternateContent xmlns:mc="http://schemas.openxmlformats.org/markup-compatibility/2006">
                 <mc:Choice xmlns:v="urn:schemas-microsoft-com:vml" Requires="v">
-                  <p:oleObj spid="_x0000_s15464" name="Equation" r:id="rId8" imgW="203040" imgH="253800" progId="Equation.DSMT4">
+                  <p:oleObj spid="_x0000_s15482" name="Equation" r:id="rId8" imgW="203040" imgH="253800" progId="Equation.DSMT4">
                     <p:embed/>
                   </p:oleObj>
                 </mc:Choice>
@@ -27070,7 +27214,7 @@
             <a:graphicData uri="http://schemas.openxmlformats.org/presentationml/2006/ole">
               <mc:AlternateContent xmlns:mc="http://schemas.openxmlformats.org/markup-compatibility/2006">
                 <mc:Choice xmlns:v="urn:schemas-microsoft-com:vml" Requires="v">
-                  <p:oleObj spid="_x0000_s15465" name="Equation" r:id="rId10" imgW="190440" imgH="228600" progId="Equation.DSMT4">
+                  <p:oleObj spid="_x0000_s15483" name="Equation" r:id="rId10" imgW="190440" imgH="228600" progId="Equation.DSMT4">
                     <p:embed/>
                   </p:oleObj>
                 </mc:Choice>
@@ -27139,7 +27283,7 @@
             <a:graphicData uri="http://schemas.openxmlformats.org/presentationml/2006/ole">
               <mc:AlternateContent xmlns:mc="http://schemas.openxmlformats.org/markup-compatibility/2006">
                 <mc:Choice xmlns:v="urn:schemas-microsoft-com:vml" Requires="v">
-                  <p:oleObj spid="_x0000_s15466" name="Equation" r:id="rId12" imgW="241200" imgH="253800" progId="Equation.DSMT4">
+                  <p:oleObj spid="_x0000_s15484" name="Equation" r:id="rId12" imgW="241200" imgH="253800" progId="Equation.DSMT4">
                     <p:embed/>
                   </p:oleObj>
                 </mc:Choice>
@@ -27228,7 +27372,7 @@
               <a:graphicData uri="http://schemas.openxmlformats.org/presentationml/2006/ole">
                 <mc:AlternateContent xmlns:mc="http://schemas.openxmlformats.org/markup-compatibility/2006">
                   <mc:Choice xmlns:v="urn:schemas-microsoft-com:vml" Requires="v">
-                    <p:oleObj spid="_x0000_s15467" name="Equation" r:id="rId14" imgW="596880" imgH="241200" progId="Equation.DSMT4">
+                    <p:oleObj spid="_x0000_s15485" name="Equation" r:id="rId14" imgW="596880" imgH="241200" progId="Equation.DSMT4">
                       <p:embed/>
                     </p:oleObj>
                   </mc:Choice>
@@ -27354,7 +27498,7 @@
               <a:graphicData uri="http://schemas.openxmlformats.org/presentationml/2006/ole">
                 <mc:AlternateContent xmlns:mc="http://schemas.openxmlformats.org/markup-compatibility/2006">
                   <mc:Choice xmlns:v="urn:schemas-microsoft-com:vml" Requires="v">
-                    <p:oleObj spid="_x0000_s15468" name="Equation" r:id="rId16" imgW="622080" imgH="241200" progId="Equation.DSMT4">
+                    <p:oleObj spid="_x0000_s15486" name="Equation" r:id="rId16" imgW="622080" imgH="241200" progId="Equation.DSMT4">
                       <p:embed/>
                     </p:oleObj>
                   </mc:Choice>
@@ -27480,7 +27624,7 @@
               <a:graphicData uri="http://schemas.openxmlformats.org/presentationml/2006/ole">
                 <mc:AlternateContent xmlns:mc="http://schemas.openxmlformats.org/markup-compatibility/2006">
                   <mc:Choice xmlns:v="urn:schemas-microsoft-com:vml" Requires="v">
-                    <p:oleObj spid="_x0000_s15469" name="Equation" r:id="rId18" imgW="609480" imgH="241200" progId="Equation.DSMT4">
+                    <p:oleObj spid="_x0000_s15487" name="Equation" r:id="rId18" imgW="609480" imgH="241200" progId="Equation.DSMT4">
                       <p:embed/>
                     </p:oleObj>
                   </mc:Choice>
@@ -28327,7 +28471,7 @@
           <a:graphicData uri="http://schemas.openxmlformats.org/presentationml/2006/ole">
             <mc:AlternateContent xmlns:mc="http://schemas.openxmlformats.org/markup-compatibility/2006">
               <mc:Choice xmlns:v="urn:schemas-microsoft-com:vml" Requires="v">
-                <p:oleObj spid="_x0000_s16416" name="Equation" r:id="rId5" imgW="393480" imgH="203040" progId="Equation.DSMT4">
+                <p:oleObj spid="_x0000_s16422" name="Equation" r:id="rId5" imgW="393480" imgH="203040" progId="Equation.DSMT4">
                   <p:embed/>
                 </p:oleObj>
               </mc:Choice>
@@ -28378,7 +28522,7 @@
           <a:graphicData uri="http://schemas.openxmlformats.org/presentationml/2006/ole">
             <mc:AlternateContent xmlns:mc="http://schemas.openxmlformats.org/markup-compatibility/2006">
               <mc:Choice xmlns:v="urn:schemas-microsoft-com:vml" Requires="v">
-                <p:oleObj spid="_x0000_s16417" name="Equation" r:id="rId7" imgW="355320" imgH="203040" progId="Equation.DSMT4">
+                <p:oleObj spid="_x0000_s16423" name="Equation" r:id="rId7" imgW="355320" imgH="203040" progId="Equation.DSMT4">
                   <p:embed/>
                 </p:oleObj>
               </mc:Choice>

</xml_diff>